<commit_message>
Updated docs with tools
</commit_message>
<xml_diff>
--- a/Tutorial/Distribution Tutorial.pptx
+++ b/Tutorial/Distribution Tutorial.pptx
@@ -5,10 +5,10 @@
     <p:sldMasterId id="2147483648" r:id="rId1"/>
   </p:sldMasterIdLst>
   <p:notesMasterIdLst>
-    <p:notesMasterId r:id="rId22"/>
+    <p:notesMasterId r:id="rId23"/>
   </p:notesMasterIdLst>
   <p:handoutMasterIdLst>
-    <p:handoutMasterId r:id="rId23"/>
+    <p:handoutMasterId r:id="rId24"/>
   </p:handoutMasterIdLst>
   <p:sldIdLst>
     <p:sldId id="256" r:id="rId2"/>
@@ -30,7 +30,8 @@
     <p:sldId id="308" r:id="rId18"/>
     <p:sldId id="309" r:id="rId19"/>
     <p:sldId id="310" r:id="rId20"/>
-    <p:sldId id="292" r:id="rId21"/>
+    <p:sldId id="311" r:id="rId21"/>
+    <p:sldId id="292" r:id="rId22"/>
   </p:sldIdLst>
   <p:sldSz cx="12192000" cy="6858000"/>
   <p:notesSz cx="6794500" cy="9906000"/>
@@ -16458,6 +16459,468 @@
       </p:grpSpPr>
       <p:sp>
         <p:nvSpPr>
+          <p:cNvPr id="2" name="Platshållare för innehåll 1">
+            <a:extLst>
+              <a:ext uri="{FF2B5EF4-FFF2-40B4-BE49-F238E27FC236}">
+                <a16:creationId xmlns:a16="http://schemas.microsoft.com/office/drawing/2014/main" id="{D2565F7D-88F3-4571-90DF-9102CA095CC2}"/>
+              </a:ext>
+            </a:extLst>
+          </p:cNvPr>
+          <p:cNvSpPr>
+            <a:spLocks noGrp="1"/>
+          </p:cNvSpPr>
+          <p:nvPr>
+            <p:ph idx="1"/>
+          </p:nvPr>
+        </p:nvSpPr>
+        <p:spPr/>
+        <p:txBody>
+          <a:bodyPr/>
+          <a:lstStyle/>
+          <a:p>
+            <a:r>
+              <a:rPr lang="en-US" dirty="0"/>
+              <a:t>We need a good way to debug objects and events</a:t>
+            </a:r>
+          </a:p>
+          <a:p>
+            <a:r>
+              <a:rPr lang="en-US" dirty="0"/>
+              <a:t>Inspect Subscriptions</a:t>
+            </a:r>
+          </a:p>
+          <a:p>
+            <a:r>
+              <a:rPr lang="en-US" dirty="0"/>
+              <a:t>Inspect Objects</a:t>
+            </a:r>
+          </a:p>
+          <a:p>
+            <a:r>
+              <a:rPr lang="en-US" dirty="0"/>
+              <a:t>Inspect Attributes</a:t>
+            </a:r>
+          </a:p>
+          <a:p>
+            <a:r>
+              <a:rPr lang="en-US" dirty="0"/>
+              <a:t>Follow Events</a:t>
+            </a:r>
+          </a:p>
+          <a:p>
+            <a:pPr marL="3600" indent="0">
+              <a:buNone/>
+            </a:pPr>
+            <a:endParaRPr lang="en-US" dirty="0"/>
+          </a:p>
+        </p:txBody>
+      </p:sp>
+      <p:sp>
+        <p:nvSpPr>
+          <p:cNvPr id="5" name="Platshållare för bildnummer 4">
+            <a:extLst>
+              <a:ext uri="{FF2B5EF4-FFF2-40B4-BE49-F238E27FC236}">
+                <a16:creationId xmlns:a16="http://schemas.microsoft.com/office/drawing/2014/main" id="{A38D3D32-A6D4-4A54-B035-415C6738F63B}"/>
+              </a:ext>
+            </a:extLst>
+          </p:cNvPr>
+          <p:cNvSpPr>
+            <a:spLocks noGrp="1"/>
+          </p:cNvSpPr>
+          <p:nvPr>
+            <p:ph type="sldNum" sz="quarter" idx="4"/>
+          </p:nvPr>
+        </p:nvSpPr>
+        <p:spPr/>
+        <p:txBody>
+          <a:bodyPr/>
+          <a:lstStyle/>
+          <a:p>
+            <a:fld id="{9B02D930-DB44-4942-904E-E6F11B0F3050}" type="slidenum">
+              <a:rPr lang="en-GB" smtClean="0"/>
+              <a:pPr/>
+              <a:t>20</a:t>
+            </a:fld>
+            <a:endParaRPr lang="en-GB" dirty="0"/>
+          </a:p>
+        </p:txBody>
+      </p:sp>
+      <p:sp>
+        <p:nvSpPr>
+          <p:cNvPr id="6" name="Rubrik 5">
+            <a:extLst>
+              <a:ext uri="{FF2B5EF4-FFF2-40B4-BE49-F238E27FC236}">
+                <a16:creationId xmlns:a16="http://schemas.microsoft.com/office/drawing/2014/main" id="{956DB316-F455-4DE9-8D4D-E8E30BF76BA1}"/>
+              </a:ext>
+            </a:extLst>
+          </p:cNvPr>
+          <p:cNvSpPr>
+            <a:spLocks noGrp="1"/>
+          </p:cNvSpPr>
+          <p:nvPr>
+            <p:ph type="title"/>
+          </p:nvPr>
+        </p:nvSpPr>
+        <p:spPr/>
+        <p:txBody>
+          <a:bodyPr/>
+          <a:lstStyle/>
+          <a:p>
+            <a:r>
+              <a:rPr lang="en-US" dirty="0"/>
+              <a:t>Tools - Debugging</a:t>
+            </a:r>
+          </a:p>
+        </p:txBody>
+      </p:sp>
+      <p:pic>
+        <p:nvPicPr>
+          <p:cNvPr id="3" name="Bildobjekt 2">
+            <a:extLst>
+              <a:ext uri="{FF2B5EF4-FFF2-40B4-BE49-F238E27FC236}">
+                <a16:creationId xmlns:a16="http://schemas.microsoft.com/office/drawing/2014/main" id="{3722CC08-D7CD-4A11-8BD7-AA28C531BDB7}"/>
+              </a:ext>
+            </a:extLst>
+          </p:cNvPr>
+          <p:cNvPicPr>
+            <a:picLocks noChangeAspect="1"/>
+          </p:cNvPicPr>
+          <p:nvPr/>
+        </p:nvPicPr>
+        <p:blipFill>
+          <a:blip r:embed="rId2"/>
+          <a:stretch>
+            <a:fillRect/>
+          </a:stretch>
+        </p:blipFill>
+        <p:spPr>
+          <a:xfrm>
+            <a:off x="6541979" y="2050075"/>
+            <a:ext cx="5280133" cy="4555925"/>
+          </a:xfrm>
+          <a:prstGeom prst="rect">
+            <a:avLst/>
+          </a:prstGeom>
+        </p:spPr>
+      </p:pic>
+    </p:spTree>
+    <p:extLst>
+      <p:ext uri="{BB962C8B-B14F-4D97-AF65-F5344CB8AC3E}">
+        <p14:creationId xmlns:p14="http://schemas.microsoft.com/office/powerpoint/2010/main" val="1527603095"/>
+      </p:ext>
+    </p:extLst>
+  </p:cSld>
+  <p:clrMapOvr>
+    <a:masterClrMapping/>
+  </p:clrMapOvr>
+  <mc:AlternateContent xmlns:mc="http://schemas.openxmlformats.org/markup-compatibility/2006" xmlns:p14="http://schemas.microsoft.com/office/powerpoint/2010/main">
+    <mc:Choice Requires="p14">
+      <p:transition spd="slow" p14:dur="6750" advClick="0"/>
+    </mc:Choice>
+    <mc:Fallback xmlns="">
+      <p:transition spd="slow" advClick="0"/>
+    </mc:Fallback>
+  </mc:AlternateContent>
+  <p:timing>
+    <p:tnLst>
+      <p:par>
+        <p:cTn id="1" dur="indefinite" restart="never" nodeType="tmRoot">
+          <p:childTnLst>
+            <p:seq concurrent="1" nextAc="seek">
+              <p:cTn id="2" dur="indefinite" nodeType="mainSeq">
+                <p:childTnLst>
+                  <p:par>
+                    <p:cTn id="3" fill="hold">
+                      <p:stCondLst>
+                        <p:cond delay="indefinite"/>
+                      </p:stCondLst>
+                      <p:childTnLst>
+                        <p:par>
+                          <p:cTn id="4" fill="hold">
+                            <p:stCondLst>
+                              <p:cond delay="0"/>
+                            </p:stCondLst>
+                            <p:childTnLst>
+                              <p:par>
+                                <p:cTn id="5" presetID="1" presetClass="entr" presetSubtype="0" fill="hold" grpId="0" nodeType="clickEffect">
+                                  <p:stCondLst>
+                                    <p:cond delay="0"/>
+                                  </p:stCondLst>
+                                  <p:childTnLst>
+                                    <p:set>
+                                      <p:cBhvr>
+                                        <p:cTn id="6" dur="1" fill="hold">
+                                          <p:stCondLst>
+                                            <p:cond delay="0"/>
+                                          </p:stCondLst>
+                                        </p:cTn>
+                                        <p:tgtEl>
+                                          <p:spTgt spid="2">
+                                            <p:txEl>
+                                              <p:pRg st="0" end="0"/>
+                                            </p:txEl>
+                                          </p:spTgt>
+                                        </p:tgtEl>
+                                        <p:attrNameLst>
+                                          <p:attrName>style.visibility</p:attrName>
+                                        </p:attrNameLst>
+                                      </p:cBhvr>
+                                      <p:to>
+                                        <p:strVal val="visible"/>
+                                      </p:to>
+                                    </p:set>
+                                  </p:childTnLst>
+                                </p:cTn>
+                              </p:par>
+                            </p:childTnLst>
+                          </p:cTn>
+                        </p:par>
+                      </p:childTnLst>
+                    </p:cTn>
+                  </p:par>
+                  <p:par>
+                    <p:cTn id="7" fill="hold">
+                      <p:stCondLst>
+                        <p:cond delay="indefinite"/>
+                      </p:stCondLst>
+                      <p:childTnLst>
+                        <p:par>
+                          <p:cTn id="8" fill="hold">
+                            <p:stCondLst>
+                              <p:cond delay="0"/>
+                            </p:stCondLst>
+                            <p:childTnLst>
+                              <p:par>
+                                <p:cTn id="9" presetID="1" presetClass="entr" presetSubtype="0" fill="hold" grpId="0" nodeType="clickEffect">
+                                  <p:stCondLst>
+                                    <p:cond delay="0"/>
+                                  </p:stCondLst>
+                                  <p:childTnLst>
+                                    <p:set>
+                                      <p:cBhvr>
+                                        <p:cTn id="10" dur="1" fill="hold">
+                                          <p:stCondLst>
+                                            <p:cond delay="0"/>
+                                          </p:stCondLst>
+                                        </p:cTn>
+                                        <p:tgtEl>
+                                          <p:spTgt spid="2">
+                                            <p:txEl>
+                                              <p:pRg st="1" end="1"/>
+                                            </p:txEl>
+                                          </p:spTgt>
+                                        </p:tgtEl>
+                                        <p:attrNameLst>
+                                          <p:attrName>style.visibility</p:attrName>
+                                        </p:attrNameLst>
+                                      </p:cBhvr>
+                                      <p:to>
+                                        <p:strVal val="visible"/>
+                                      </p:to>
+                                    </p:set>
+                                  </p:childTnLst>
+                                </p:cTn>
+                              </p:par>
+                            </p:childTnLst>
+                          </p:cTn>
+                        </p:par>
+                      </p:childTnLst>
+                    </p:cTn>
+                  </p:par>
+                  <p:par>
+                    <p:cTn id="11" fill="hold">
+                      <p:stCondLst>
+                        <p:cond delay="indefinite"/>
+                      </p:stCondLst>
+                      <p:childTnLst>
+                        <p:par>
+                          <p:cTn id="12" fill="hold">
+                            <p:stCondLst>
+                              <p:cond delay="0"/>
+                            </p:stCondLst>
+                            <p:childTnLst>
+                              <p:par>
+                                <p:cTn id="13" presetID="1" presetClass="entr" presetSubtype="0" fill="hold" grpId="0" nodeType="clickEffect">
+                                  <p:stCondLst>
+                                    <p:cond delay="0"/>
+                                  </p:stCondLst>
+                                  <p:childTnLst>
+                                    <p:set>
+                                      <p:cBhvr>
+                                        <p:cTn id="14" dur="1" fill="hold">
+                                          <p:stCondLst>
+                                            <p:cond delay="0"/>
+                                          </p:stCondLst>
+                                        </p:cTn>
+                                        <p:tgtEl>
+                                          <p:spTgt spid="2">
+                                            <p:txEl>
+                                              <p:pRg st="2" end="2"/>
+                                            </p:txEl>
+                                          </p:spTgt>
+                                        </p:tgtEl>
+                                        <p:attrNameLst>
+                                          <p:attrName>style.visibility</p:attrName>
+                                        </p:attrNameLst>
+                                      </p:cBhvr>
+                                      <p:to>
+                                        <p:strVal val="visible"/>
+                                      </p:to>
+                                    </p:set>
+                                  </p:childTnLst>
+                                </p:cTn>
+                              </p:par>
+                            </p:childTnLst>
+                          </p:cTn>
+                        </p:par>
+                      </p:childTnLst>
+                    </p:cTn>
+                  </p:par>
+                  <p:par>
+                    <p:cTn id="15" fill="hold">
+                      <p:stCondLst>
+                        <p:cond delay="indefinite"/>
+                      </p:stCondLst>
+                      <p:childTnLst>
+                        <p:par>
+                          <p:cTn id="16" fill="hold">
+                            <p:stCondLst>
+                              <p:cond delay="0"/>
+                            </p:stCondLst>
+                            <p:childTnLst>
+                              <p:par>
+                                <p:cTn id="17" presetID="1" presetClass="entr" presetSubtype="0" fill="hold" grpId="0" nodeType="clickEffect">
+                                  <p:stCondLst>
+                                    <p:cond delay="0"/>
+                                  </p:stCondLst>
+                                  <p:childTnLst>
+                                    <p:set>
+                                      <p:cBhvr>
+                                        <p:cTn id="18" dur="1" fill="hold">
+                                          <p:stCondLst>
+                                            <p:cond delay="0"/>
+                                          </p:stCondLst>
+                                        </p:cTn>
+                                        <p:tgtEl>
+                                          <p:spTgt spid="2">
+                                            <p:txEl>
+                                              <p:pRg st="3" end="3"/>
+                                            </p:txEl>
+                                          </p:spTgt>
+                                        </p:tgtEl>
+                                        <p:attrNameLst>
+                                          <p:attrName>style.visibility</p:attrName>
+                                        </p:attrNameLst>
+                                      </p:cBhvr>
+                                      <p:to>
+                                        <p:strVal val="visible"/>
+                                      </p:to>
+                                    </p:set>
+                                  </p:childTnLst>
+                                </p:cTn>
+                              </p:par>
+                            </p:childTnLst>
+                          </p:cTn>
+                        </p:par>
+                      </p:childTnLst>
+                    </p:cTn>
+                  </p:par>
+                  <p:par>
+                    <p:cTn id="19" fill="hold">
+                      <p:stCondLst>
+                        <p:cond delay="indefinite"/>
+                      </p:stCondLst>
+                      <p:childTnLst>
+                        <p:par>
+                          <p:cTn id="20" fill="hold">
+                            <p:stCondLst>
+                              <p:cond delay="0"/>
+                            </p:stCondLst>
+                            <p:childTnLst>
+                              <p:par>
+                                <p:cTn id="21" presetID="1" presetClass="entr" presetSubtype="0" fill="hold" grpId="0" nodeType="clickEffect">
+                                  <p:stCondLst>
+                                    <p:cond delay="0"/>
+                                  </p:stCondLst>
+                                  <p:childTnLst>
+                                    <p:set>
+                                      <p:cBhvr>
+                                        <p:cTn id="22" dur="1" fill="hold">
+                                          <p:stCondLst>
+                                            <p:cond delay="0"/>
+                                          </p:stCondLst>
+                                        </p:cTn>
+                                        <p:tgtEl>
+                                          <p:spTgt spid="2">
+                                            <p:txEl>
+                                              <p:pRg st="4" end="4"/>
+                                            </p:txEl>
+                                          </p:spTgt>
+                                        </p:tgtEl>
+                                        <p:attrNameLst>
+                                          <p:attrName>style.visibility</p:attrName>
+                                        </p:attrNameLst>
+                                      </p:cBhvr>
+                                      <p:to>
+                                        <p:strVal val="visible"/>
+                                      </p:to>
+                                    </p:set>
+                                  </p:childTnLst>
+                                </p:cTn>
+                              </p:par>
+                            </p:childTnLst>
+                          </p:cTn>
+                        </p:par>
+                      </p:childTnLst>
+                    </p:cTn>
+                  </p:par>
+                </p:childTnLst>
+              </p:cTn>
+              <p:prevCondLst>
+                <p:cond evt="onPrev" delay="0">
+                  <p:tgtEl>
+                    <p:sldTgt/>
+                  </p:tgtEl>
+                </p:cond>
+              </p:prevCondLst>
+              <p:nextCondLst>
+                <p:cond evt="onNext" delay="0">
+                  <p:tgtEl>
+                    <p:sldTgt/>
+                  </p:tgtEl>
+                </p:cond>
+              </p:nextCondLst>
+            </p:seq>
+          </p:childTnLst>
+        </p:cTn>
+      </p:par>
+    </p:tnLst>
+    <p:bldLst>
+      <p:bldP spid="2" grpId="0" build="p"/>
+    </p:bldLst>
+  </p:timing>
+</p:sld>
+</file>
+
+<file path=ppt/slides/slide21.xml><?xml version="1.0" encoding="utf-8"?>
+<p:sld xmlns:a="http://schemas.openxmlformats.org/drawingml/2006/main" xmlns:r="http://schemas.openxmlformats.org/officeDocument/2006/relationships" xmlns:p="http://schemas.openxmlformats.org/presentationml/2006/main">
+  <p:cSld>
+    <p:spTree>
+      <p:nvGrpSpPr>
+        <p:cNvPr id="1" name=""/>
+        <p:cNvGrpSpPr/>
+        <p:nvPr/>
+      </p:nvGrpSpPr>
+      <p:grpSpPr>
+        <a:xfrm>
+          <a:off x="0" y="0"/>
+          <a:ext cx="0" cy="0"/>
+          <a:chOff x="0" y="0"/>
+          <a:chExt cx="0" cy="0"/>
+        </a:xfrm>
+      </p:grpSpPr>
+      <p:sp>
+        <p:nvSpPr>
           <p:cNvPr id="6" name="Platshållare för text 5">
             <a:extLst>
               <a:ext uri="{FF2B5EF4-FFF2-40B4-BE49-F238E27FC236}">
@@ -16508,7 +16971,7 @@
             <a:fld id="{9B02D930-DB44-4942-904E-E6F11B0F3050}" type="slidenum">
               <a:rPr lang="en-GB" smtClean="0"/>
               <a:pPr/>
-              <a:t>20</a:t>
+              <a:t>21</a:t>
             </a:fld>
             <a:endParaRPr lang="en-GB" dirty="0"/>
           </a:p>

</xml_diff>